<commit_message>
kalman filter update docs
</commit_message>
<xml_diff>
--- a/docs/pptx/LieGroups.pptx
+++ b/docs/pptx/LieGroups.pptx
@@ -23,6 +23,14 @@
     <p:sldId id="264" r:id="rId16"/>
     <p:sldId id="265" r:id="rId17"/>
     <p:sldId id="266" r:id="rId18"/>
+    <p:sldId id="281" r:id="rId19"/>
+    <p:sldId id="282" r:id="rId20"/>
+    <p:sldId id="283" r:id="rId21"/>
+    <p:sldId id="284" r:id="rId22"/>
+    <p:sldId id="285" r:id="rId23"/>
+    <p:sldId id="286" r:id="rId24"/>
+    <p:sldId id="287" r:id="rId25"/>
+    <p:sldId id="288" r:id="rId26"/>
   </p:sldIdLst>
   <p:sldSz cx="12192000" cy="6858000"/>
   <p:notesSz cx="6858000" cy="9144000"/>
@@ -516,6 +524,270 @@
 </file>
 
 <file path=ppt/notesSlides/notesSlide2.xml><?xml version="1.0" encoding="utf-8"?>
+<p:notes xmlns:a="http://schemas.openxmlformats.org/drawingml/2006/main" xmlns:r="http://schemas.openxmlformats.org/officeDocument/2006/relationships" xmlns:p="http://schemas.openxmlformats.org/presentationml/2006/main">
+  <p:cSld>
+    <p:spTree>
+      <p:nvGrpSpPr>
+        <p:cNvPr id="1" name=""/>
+        <p:cNvGrpSpPr/>
+        <p:nvPr/>
+      </p:nvGrpSpPr>
+      <p:grpSpPr/>
+      <p:sp>
+        <p:nvSpPr>
+          <p:cNvPr id="2" name="幻灯片图像占位符 1"/>
+          <p:cNvSpPr/>
+          <p:nvPr>
+            <p:ph type="sldImg" idx="2"/>
+          </p:nvPr>
+        </p:nvSpPr>
+        <p:spPr/>
+      </p:sp>
+      <p:sp>
+        <p:nvSpPr>
+          <p:cNvPr id="3" name="文本占位符 2"/>
+          <p:cNvSpPr/>
+          <p:nvPr>
+            <p:ph type="body" idx="3"/>
+          </p:nvPr>
+        </p:nvSpPr>
+        <p:spPr/>
+        <p:txBody>
+          <a:bodyPr/>
+          <a:p>
+            <a:endParaRPr lang="zh-CN" altLang="en-US"/>
+          </a:p>
+        </p:txBody>
+      </p:sp>
+    </p:spTree>
+  </p:cSld>
+  <p:clrMapOvr>
+    <a:masterClrMapping/>
+  </p:clrMapOvr>
+</p:notes>
+</file>
+
+<file path=ppt/notesSlides/notesSlide3.xml><?xml version="1.0" encoding="utf-8"?>
+<p:notes xmlns:a="http://schemas.openxmlformats.org/drawingml/2006/main" xmlns:r="http://schemas.openxmlformats.org/officeDocument/2006/relationships" xmlns:p="http://schemas.openxmlformats.org/presentationml/2006/main">
+  <p:cSld>
+    <p:spTree>
+      <p:nvGrpSpPr>
+        <p:cNvPr id="1" name=""/>
+        <p:cNvGrpSpPr/>
+        <p:nvPr/>
+      </p:nvGrpSpPr>
+      <p:grpSpPr/>
+      <p:sp>
+        <p:nvSpPr>
+          <p:cNvPr id="2" name="幻灯片图像占位符 1"/>
+          <p:cNvSpPr/>
+          <p:nvPr>
+            <p:ph type="sldImg" idx="2"/>
+          </p:nvPr>
+        </p:nvSpPr>
+        <p:spPr/>
+      </p:sp>
+      <p:sp>
+        <p:nvSpPr>
+          <p:cNvPr id="3" name="文本占位符 2"/>
+          <p:cNvSpPr/>
+          <p:nvPr>
+            <p:ph type="body" idx="3"/>
+          </p:nvPr>
+        </p:nvSpPr>
+        <p:spPr/>
+        <p:txBody>
+          <a:bodyPr/>
+          <a:p>
+            <a:endParaRPr lang="zh-CN" altLang="en-US"/>
+          </a:p>
+        </p:txBody>
+      </p:sp>
+    </p:spTree>
+  </p:cSld>
+  <p:clrMapOvr>
+    <a:masterClrMapping/>
+  </p:clrMapOvr>
+</p:notes>
+</file>
+
+<file path=ppt/notesSlides/notesSlide4.xml><?xml version="1.0" encoding="utf-8"?>
+<p:notes xmlns:a="http://schemas.openxmlformats.org/drawingml/2006/main" xmlns:r="http://schemas.openxmlformats.org/officeDocument/2006/relationships" xmlns:p="http://schemas.openxmlformats.org/presentationml/2006/main">
+  <p:cSld>
+    <p:spTree>
+      <p:nvGrpSpPr>
+        <p:cNvPr id="1" name=""/>
+        <p:cNvGrpSpPr/>
+        <p:nvPr/>
+      </p:nvGrpSpPr>
+      <p:grpSpPr/>
+      <p:sp>
+        <p:nvSpPr>
+          <p:cNvPr id="2" name="幻灯片图像占位符 1"/>
+          <p:cNvSpPr/>
+          <p:nvPr>
+            <p:ph type="sldImg" idx="2"/>
+          </p:nvPr>
+        </p:nvSpPr>
+        <p:spPr/>
+      </p:sp>
+      <p:sp>
+        <p:nvSpPr>
+          <p:cNvPr id="3" name="文本占位符 2"/>
+          <p:cNvSpPr/>
+          <p:nvPr>
+            <p:ph type="body" idx="3"/>
+          </p:nvPr>
+        </p:nvSpPr>
+        <p:spPr/>
+        <p:txBody>
+          <a:bodyPr/>
+          <a:p>
+            <a:endParaRPr lang="zh-CN" altLang="en-US"/>
+          </a:p>
+        </p:txBody>
+      </p:sp>
+    </p:spTree>
+  </p:cSld>
+  <p:clrMapOvr>
+    <a:masterClrMapping/>
+  </p:clrMapOvr>
+</p:notes>
+</file>
+
+<file path=ppt/notesSlides/notesSlide5.xml><?xml version="1.0" encoding="utf-8"?>
+<p:notes xmlns:a="http://schemas.openxmlformats.org/drawingml/2006/main" xmlns:r="http://schemas.openxmlformats.org/officeDocument/2006/relationships" xmlns:p="http://schemas.openxmlformats.org/presentationml/2006/main">
+  <p:cSld>
+    <p:spTree>
+      <p:nvGrpSpPr>
+        <p:cNvPr id="1" name=""/>
+        <p:cNvGrpSpPr/>
+        <p:nvPr/>
+      </p:nvGrpSpPr>
+      <p:grpSpPr/>
+      <p:sp>
+        <p:nvSpPr>
+          <p:cNvPr id="2" name="幻灯片图像占位符 1"/>
+          <p:cNvSpPr/>
+          <p:nvPr>
+            <p:ph type="sldImg" idx="2"/>
+          </p:nvPr>
+        </p:nvSpPr>
+        <p:spPr/>
+      </p:sp>
+      <p:sp>
+        <p:nvSpPr>
+          <p:cNvPr id="3" name="文本占位符 2"/>
+          <p:cNvSpPr/>
+          <p:nvPr>
+            <p:ph type="body" idx="3"/>
+          </p:nvPr>
+        </p:nvSpPr>
+        <p:spPr/>
+        <p:txBody>
+          <a:bodyPr/>
+          <a:p>
+            <a:endParaRPr lang="zh-CN" altLang="en-US"/>
+          </a:p>
+        </p:txBody>
+      </p:sp>
+    </p:spTree>
+  </p:cSld>
+  <p:clrMapOvr>
+    <a:masterClrMapping/>
+  </p:clrMapOvr>
+</p:notes>
+</file>
+
+<file path=ppt/notesSlides/notesSlide6.xml><?xml version="1.0" encoding="utf-8"?>
+<p:notes xmlns:a="http://schemas.openxmlformats.org/drawingml/2006/main" xmlns:r="http://schemas.openxmlformats.org/officeDocument/2006/relationships" xmlns:p="http://schemas.openxmlformats.org/presentationml/2006/main">
+  <p:cSld>
+    <p:spTree>
+      <p:nvGrpSpPr>
+        <p:cNvPr id="1" name=""/>
+        <p:cNvGrpSpPr/>
+        <p:nvPr/>
+      </p:nvGrpSpPr>
+      <p:grpSpPr/>
+      <p:sp>
+        <p:nvSpPr>
+          <p:cNvPr id="2" name="幻灯片图像占位符 1"/>
+          <p:cNvSpPr/>
+          <p:nvPr>
+            <p:ph type="sldImg" idx="2"/>
+          </p:nvPr>
+        </p:nvSpPr>
+        <p:spPr/>
+      </p:sp>
+      <p:sp>
+        <p:nvSpPr>
+          <p:cNvPr id="3" name="文本占位符 2"/>
+          <p:cNvSpPr/>
+          <p:nvPr>
+            <p:ph type="body" idx="3"/>
+          </p:nvPr>
+        </p:nvSpPr>
+        <p:spPr/>
+        <p:txBody>
+          <a:bodyPr/>
+          <a:p>
+            <a:endParaRPr lang="zh-CN" altLang="en-US"/>
+          </a:p>
+        </p:txBody>
+      </p:sp>
+    </p:spTree>
+  </p:cSld>
+  <p:clrMapOvr>
+    <a:masterClrMapping/>
+  </p:clrMapOvr>
+</p:notes>
+</file>
+
+<file path=ppt/notesSlides/notesSlide7.xml><?xml version="1.0" encoding="utf-8"?>
+<p:notes xmlns:a="http://schemas.openxmlformats.org/drawingml/2006/main" xmlns:r="http://schemas.openxmlformats.org/officeDocument/2006/relationships" xmlns:p="http://schemas.openxmlformats.org/presentationml/2006/main">
+  <p:cSld>
+    <p:spTree>
+      <p:nvGrpSpPr>
+        <p:cNvPr id="1" name=""/>
+        <p:cNvGrpSpPr/>
+        <p:nvPr/>
+      </p:nvGrpSpPr>
+      <p:grpSpPr/>
+      <p:sp>
+        <p:nvSpPr>
+          <p:cNvPr id="2" name="幻灯片图像占位符 1"/>
+          <p:cNvSpPr/>
+          <p:nvPr>
+            <p:ph type="sldImg" idx="2"/>
+          </p:nvPr>
+        </p:nvSpPr>
+        <p:spPr/>
+      </p:sp>
+      <p:sp>
+        <p:nvSpPr>
+          <p:cNvPr id="3" name="文本占位符 2"/>
+          <p:cNvSpPr/>
+          <p:nvPr>
+            <p:ph type="body" idx="3"/>
+          </p:nvPr>
+        </p:nvSpPr>
+        <p:spPr/>
+        <p:txBody>
+          <a:bodyPr/>
+          <a:p>
+            <a:endParaRPr lang="zh-CN" altLang="en-US"/>
+          </a:p>
+        </p:txBody>
+      </p:sp>
+    </p:spTree>
+  </p:cSld>
+  <p:clrMapOvr>
+    <a:masterClrMapping/>
+  </p:clrMapOvr>
+</p:notes>
+</file>
+
+<file path=ppt/notesSlides/notesSlide8.xml><?xml version="1.0" encoding="utf-8"?>
 <p:notes xmlns:a="http://schemas.openxmlformats.org/drawingml/2006/main" xmlns:r="http://schemas.openxmlformats.org/officeDocument/2006/relationships" xmlns:p="http://schemas.openxmlformats.org/presentationml/2006/main">
   <p:cSld>
     <p:spTree>
@@ -3571,7 +3843,7 @@
       <p:sp>
         <p:nvSpPr>
           <p:cNvPr id="7" name="文本框 6">
-            <a:hlinkClick r:id="rId2" tooltip="" action="ppaction://hlinkfile"/>
+            <a:hlinkClick r:id="rId2" action="ppaction://hlinkfile"/>
           </p:cNvPr>
           <p:cNvSpPr txBox="1"/>
           <p:nvPr/>
@@ -3807,24 +4079,6 @@
           </a:p>
         </p:txBody>
       </p:sp>
-      <p:sp>
-        <p:nvSpPr>
-          <p:cNvPr id="3" name="内容占位符 2"/>
-          <p:cNvSpPr>
-            <a:spLocks noGrp="1"/>
-          </p:cNvSpPr>
-          <p:nvPr>
-            <p:ph idx="1"/>
-          </p:nvPr>
-        </p:nvSpPr>
-        <p:spPr/>
-        <p:txBody>
-          <a:bodyPr/>
-          <a:p>
-            <a:endParaRPr lang="zh-CN" altLang="en-US"/>
-          </a:p>
-        </p:txBody>
-      </p:sp>
       <p:cxnSp>
         <p:nvCxnSpPr>
           <p:cNvPr id="4" name="直接连接符 3"/>
@@ -3861,6 +4115,32 @@
           </a:fontRef>
         </p:style>
       </p:cxnSp>
+      <p:pic>
+        <p:nvPicPr>
+          <p:cNvPr id="5" name="内容占位符 4"/>
+          <p:cNvPicPr>
+            <a:picLocks noChangeAspect="1"/>
+          </p:cNvPicPr>
+          <p:nvPr>
+            <p:ph idx="1"/>
+          </p:nvPr>
+        </p:nvPicPr>
+        <p:blipFill>
+          <a:blip r:embed="rId1"/>
+          <a:stretch>
+            <a:fillRect/>
+          </a:stretch>
+        </p:blipFill>
+        <p:spPr>
+          <a:xfrm>
+            <a:off x="1838325" y="2251075"/>
+            <a:ext cx="8515350" cy="2028825"/>
+          </a:xfrm>
+          <a:prstGeom prst="rect">
+            <a:avLst/>
+          </a:prstGeom>
+        </p:spPr>
+      </p:pic>
     </p:spTree>
   </p:cSld>
   <p:clrMapOvr>
@@ -3911,24 +4191,6 @@
           </a:p>
         </p:txBody>
       </p:sp>
-      <p:sp>
-        <p:nvSpPr>
-          <p:cNvPr id="3" name="内容占位符 2"/>
-          <p:cNvSpPr>
-            <a:spLocks noGrp="1"/>
-          </p:cNvSpPr>
-          <p:nvPr>
-            <p:ph idx="1"/>
-          </p:nvPr>
-        </p:nvSpPr>
-        <p:spPr/>
-        <p:txBody>
-          <a:bodyPr/>
-          <a:p>
-            <a:endParaRPr lang="zh-CN" altLang="en-US"/>
-          </a:p>
-        </p:txBody>
-      </p:sp>
       <p:cxnSp>
         <p:nvCxnSpPr>
           <p:cNvPr id="4" name="直接连接符 3"/>
@@ -3965,6 +4227,32 @@
           </a:fontRef>
         </p:style>
       </p:cxnSp>
+      <p:pic>
+        <p:nvPicPr>
+          <p:cNvPr id="5" name="内容占位符 4"/>
+          <p:cNvPicPr>
+            <a:picLocks noChangeAspect="1"/>
+          </p:cNvPicPr>
+          <p:nvPr>
+            <p:ph idx="1"/>
+          </p:nvPr>
+        </p:nvPicPr>
+        <p:blipFill>
+          <a:blip r:embed="rId1"/>
+          <a:stretch>
+            <a:fillRect/>
+          </a:stretch>
+        </p:blipFill>
+        <p:spPr>
+          <a:xfrm>
+            <a:off x="1035050" y="2263775"/>
+            <a:ext cx="10515600" cy="2811780"/>
+          </a:xfrm>
+          <a:prstGeom prst="rect">
+            <a:avLst/>
+          </a:prstGeom>
+        </p:spPr>
+      </p:pic>
     </p:spTree>
   </p:cSld>
   <p:clrMapOvr>
@@ -4015,24 +4303,6 @@
           </a:p>
         </p:txBody>
       </p:sp>
-      <p:sp>
-        <p:nvSpPr>
-          <p:cNvPr id="3" name="内容占位符 2"/>
-          <p:cNvSpPr>
-            <a:spLocks noGrp="1"/>
-          </p:cNvSpPr>
-          <p:nvPr>
-            <p:ph idx="1"/>
-          </p:nvPr>
-        </p:nvSpPr>
-        <p:spPr/>
-        <p:txBody>
-          <a:bodyPr/>
-          <a:p>
-            <a:endParaRPr lang="zh-CN" altLang="en-US"/>
-          </a:p>
-        </p:txBody>
-      </p:sp>
       <p:cxnSp>
         <p:nvCxnSpPr>
           <p:cNvPr id="4" name="直接连接符 3"/>
@@ -4069,6 +4339,56 @@
           </a:fontRef>
         </p:style>
       </p:cxnSp>
+      <p:pic>
+        <p:nvPicPr>
+          <p:cNvPr id="5" name="内容占位符 4"/>
+          <p:cNvPicPr>
+            <a:picLocks noChangeAspect="1"/>
+          </p:cNvPicPr>
+          <p:nvPr>
+            <p:ph idx="1"/>
+          </p:nvPr>
+        </p:nvPicPr>
+        <p:blipFill>
+          <a:blip r:embed="rId1"/>
+          <a:stretch>
+            <a:fillRect/>
+          </a:stretch>
+        </p:blipFill>
+        <p:spPr>
+          <a:xfrm>
+            <a:off x="922020" y="2134235"/>
+            <a:ext cx="5829300" cy="1828800"/>
+          </a:xfrm>
+          <a:prstGeom prst="rect">
+            <a:avLst/>
+          </a:prstGeom>
+        </p:spPr>
+      </p:pic>
+      <p:pic>
+        <p:nvPicPr>
+          <p:cNvPr id="6" name="图片 5"/>
+          <p:cNvPicPr>
+            <a:picLocks noChangeAspect="1"/>
+          </p:cNvPicPr>
+          <p:nvPr/>
+        </p:nvPicPr>
+        <p:blipFill>
+          <a:blip r:embed="rId2"/>
+          <a:stretch>
+            <a:fillRect/>
+          </a:stretch>
+        </p:blipFill>
+        <p:spPr>
+          <a:xfrm>
+            <a:off x="7133590" y="2248535"/>
+            <a:ext cx="3705225" cy="1600200"/>
+          </a:xfrm>
+          <a:prstGeom prst="rect">
+            <a:avLst/>
+          </a:prstGeom>
+        </p:spPr>
+      </p:pic>
     </p:spTree>
   </p:cSld>
   <p:clrMapOvr>
@@ -4119,24 +4439,6 @@
           </a:p>
         </p:txBody>
       </p:sp>
-      <p:sp>
-        <p:nvSpPr>
-          <p:cNvPr id="3" name="内容占位符 2"/>
-          <p:cNvSpPr>
-            <a:spLocks noGrp="1"/>
-          </p:cNvSpPr>
-          <p:nvPr>
-            <p:ph idx="1"/>
-          </p:nvPr>
-        </p:nvSpPr>
-        <p:spPr/>
-        <p:txBody>
-          <a:bodyPr/>
-          <a:p>
-            <a:endParaRPr lang="zh-CN" altLang="en-US"/>
-          </a:p>
-        </p:txBody>
-      </p:sp>
       <p:cxnSp>
         <p:nvCxnSpPr>
           <p:cNvPr id="4" name="直接连接符 3"/>
@@ -4173,6 +4475,553 @@
           </a:fontRef>
         </p:style>
       </p:cxnSp>
+      <p:pic>
+        <p:nvPicPr>
+          <p:cNvPr id="5" name="内容占位符 4"/>
+          <p:cNvPicPr>
+            <a:picLocks noChangeAspect="1"/>
+          </p:cNvPicPr>
+          <p:nvPr>
+            <p:ph idx="1"/>
+          </p:nvPr>
+        </p:nvPicPr>
+        <p:blipFill>
+          <a:blip r:embed="rId1"/>
+          <a:stretch>
+            <a:fillRect/>
+          </a:stretch>
+        </p:blipFill>
+        <p:spPr>
+          <a:xfrm>
+            <a:off x="819785" y="1535430"/>
+            <a:ext cx="5381625" cy="1104900"/>
+          </a:xfrm>
+          <a:prstGeom prst="rect">
+            <a:avLst/>
+          </a:prstGeom>
+        </p:spPr>
+      </p:pic>
+      <p:pic>
+        <p:nvPicPr>
+          <p:cNvPr id="6" name="图片 5"/>
+          <p:cNvPicPr>
+            <a:picLocks noChangeAspect="1"/>
+          </p:cNvPicPr>
+          <p:nvPr/>
+        </p:nvPicPr>
+        <p:blipFill>
+          <a:blip r:embed="rId2"/>
+          <a:stretch>
+            <a:fillRect/>
+          </a:stretch>
+        </p:blipFill>
+        <p:spPr>
+          <a:xfrm>
+            <a:off x="1993900" y="2515235"/>
+            <a:ext cx="10229850" cy="4305300"/>
+          </a:xfrm>
+          <a:prstGeom prst="rect">
+            <a:avLst/>
+          </a:prstGeom>
+        </p:spPr>
+      </p:pic>
+    </p:spTree>
+  </p:cSld>
+  <p:clrMapOvr>
+    <a:masterClrMapping/>
+  </p:clrMapOvr>
+</p:sld>
+</file>
+
+<file path=ppt/slides/slide16.xml><?xml version="1.0" encoding="utf-8"?>
+<p:sld xmlns:a="http://schemas.openxmlformats.org/drawingml/2006/main" xmlns:r="http://schemas.openxmlformats.org/officeDocument/2006/relationships" xmlns:p="http://schemas.openxmlformats.org/presentationml/2006/main">
+  <p:cSld>
+    <p:spTree>
+      <p:nvGrpSpPr>
+        <p:cNvPr id="1" name=""/>
+        <p:cNvGrpSpPr/>
+        <p:nvPr/>
+      </p:nvGrpSpPr>
+      <p:grpSpPr/>
+      <p:sp>
+        <p:nvSpPr>
+          <p:cNvPr id="2" name="标题 1"/>
+          <p:cNvSpPr>
+            <a:spLocks noGrp="1"/>
+          </p:cNvSpPr>
+          <p:nvPr>
+            <p:ph type="title"/>
+          </p:nvPr>
+        </p:nvSpPr>
+        <p:spPr/>
+        <p:txBody>
+          <a:bodyPr>
+            <a:normAutofit/>
+          </a:bodyPr>
+          <a:p>
+            <a:r>
+              <a:rPr lang="en-US" altLang="zh-CN">
+                <a:solidFill>
+                  <a:srgbClr val="FF0000"/>
+                </a:solidFill>
+              </a:rPr>
+              <a:t>Lie Groups</a:t>
+            </a:r>
+            <a:endParaRPr lang="en-US" altLang="zh-CN">
+              <a:solidFill>
+                <a:srgbClr val="FF0000"/>
+              </a:solidFill>
+            </a:endParaRPr>
+          </a:p>
+        </p:txBody>
+      </p:sp>
+      <p:cxnSp>
+        <p:nvCxnSpPr>
+          <p:cNvPr id="4" name="直接连接符 3"/>
+          <p:cNvCxnSpPr/>
+          <p:nvPr/>
+        </p:nvCxnSpPr>
+        <p:spPr>
+          <a:xfrm>
+            <a:off x="819785" y="1450340"/>
+            <a:ext cx="10552430" cy="20955"/>
+          </a:xfrm>
+          <a:prstGeom prst="line">
+            <a:avLst/>
+          </a:prstGeom>
+          <a:ln w="47625" cmpd="sng">
+            <a:solidFill>
+              <a:schemeClr val="accent1"/>
+            </a:solidFill>
+            <a:prstDash val="solid"/>
+          </a:ln>
+        </p:spPr>
+        <p:style>
+          <a:lnRef idx="1">
+            <a:schemeClr val="accent1"/>
+          </a:lnRef>
+          <a:fillRef idx="0">
+            <a:schemeClr val="accent1"/>
+          </a:fillRef>
+          <a:effectRef idx="0">
+            <a:schemeClr val="accent1"/>
+          </a:effectRef>
+          <a:fontRef idx="minor">
+            <a:schemeClr val="tx1"/>
+          </a:fontRef>
+        </p:style>
+      </p:cxnSp>
+      <p:pic>
+        <p:nvPicPr>
+          <p:cNvPr id="7" name="内容占位符 6"/>
+          <p:cNvPicPr>
+            <a:picLocks noChangeAspect="1"/>
+          </p:cNvPicPr>
+          <p:nvPr>
+            <p:ph idx="1"/>
+          </p:nvPr>
+        </p:nvPicPr>
+        <p:blipFill>
+          <a:blip r:embed="rId1"/>
+          <a:stretch>
+            <a:fillRect/>
+          </a:stretch>
+        </p:blipFill>
+        <p:spPr>
+          <a:xfrm>
+            <a:off x="2009140" y="1852295"/>
+            <a:ext cx="7658100" cy="3152775"/>
+          </a:xfrm>
+          <a:prstGeom prst="rect">
+            <a:avLst/>
+          </a:prstGeom>
+        </p:spPr>
+      </p:pic>
+    </p:spTree>
+  </p:cSld>
+  <p:clrMapOvr>
+    <a:masterClrMapping/>
+  </p:clrMapOvr>
+</p:sld>
+</file>
+
+<file path=ppt/slides/slide17.xml><?xml version="1.0" encoding="utf-8"?>
+<p:sld xmlns:a="http://schemas.openxmlformats.org/drawingml/2006/main" xmlns:r="http://schemas.openxmlformats.org/officeDocument/2006/relationships" xmlns:p="http://schemas.openxmlformats.org/presentationml/2006/main">
+  <p:cSld>
+    <p:spTree>
+      <p:nvGrpSpPr>
+        <p:cNvPr id="1" name=""/>
+        <p:cNvGrpSpPr/>
+        <p:nvPr/>
+      </p:nvGrpSpPr>
+      <p:grpSpPr/>
+      <p:sp>
+        <p:nvSpPr>
+          <p:cNvPr id="2" name="标题 1"/>
+          <p:cNvSpPr>
+            <a:spLocks noGrp="1"/>
+          </p:cNvSpPr>
+          <p:nvPr>
+            <p:ph type="title"/>
+          </p:nvPr>
+        </p:nvSpPr>
+        <p:spPr/>
+        <p:txBody>
+          <a:bodyPr>
+            <a:normAutofit/>
+          </a:bodyPr>
+          <a:p>
+            <a:r>
+              <a:rPr lang="en-US" altLang="zh-CN">
+                <a:solidFill>
+                  <a:srgbClr val="FF0000"/>
+                </a:solidFill>
+              </a:rPr>
+              <a:t>Lie Groups</a:t>
+            </a:r>
+            <a:endParaRPr lang="en-US" altLang="zh-CN">
+              <a:solidFill>
+                <a:srgbClr val="FF0000"/>
+              </a:solidFill>
+            </a:endParaRPr>
+          </a:p>
+        </p:txBody>
+      </p:sp>
+      <p:cxnSp>
+        <p:nvCxnSpPr>
+          <p:cNvPr id="4" name="直接连接符 3"/>
+          <p:cNvCxnSpPr/>
+          <p:nvPr/>
+        </p:nvCxnSpPr>
+        <p:spPr>
+          <a:xfrm>
+            <a:off x="819785" y="1450340"/>
+            <a:ext cx="10552430" cy="20955"/>
+          </a:xfrm>
+          <a:prstGeom prst="line">
+            <a:avLst/>
+          </a:prstGeom>
+          <a:ln w="47625" cmpd="sng">
+            <a:solidFill>
+              <a:schemeClr val="accent1"/>
+            </a:solidFill>
+            <a:prstDash val="solid"/>
+          </a:ln>
+        </p:spPr>
+        <p:style>
+          <a:lnRef idx="1">
+            <a:schemeClr val="accent1"/>
+          </a:lnRef>
+          <a:fillRef idx="0">
+            <a:schemeClr val="accent1"/>
+          </a:fillRef>
+          <a:effectRef idx="0">
+            <a:schemeClr val="accent1"/>
+          </a:effectRef>
+          <a:fontRef idx="minor">
+            <a:schemeClr val="tx1"/>
+          </a:fontRef>
+        </p:style>
+      </p:cxnSp>
+      <p:pic>
+        <p:nvPicPr>
+          <p:cNvPr id="8" name="内容占位符 7"/>
+          <p:cNvPicPr>
+            <a:picLocks noChangeAspect="1"/>
+          </p:cNvPicPr>
+          <p:nvPr>
+            <p:ph idx="1"/>
+          </p:nvPr>
+        </p:nvPicPr>
+        <p:blipFill>
+          <a:blip r:embed="rId1"/>
+          <a:stretch>
+            <a:fillRect/>
+          </a:stretch>
+        </p:blipFill>
+        <p:spPr>
+          <a:xfrm>
+            <a:off x="856615" y="2104390"/>
+            <a:ext cx="10515600" cy="3317240"/>
+          </a:xfrm>
+          <a:prstGeom prst="rect">
+            <a:avLst/>
+          </a:prstGeom>
+        </p:spPr>
+      </p:pic>
+    </p:spTree>
+  </p:cSld>
+  <p:clrMapOvr>
+    <a:masterClrMapping/>
+  </p:clrMapOvr>
+</p:sld>
+</file>
+
+<file path=ppt/slides/slide18.xml><?xml version="1.0" encoding="utf-8"?>
+<p:sld xmlns:a="http://schemas.openxmlformats.org/drawingml/2006/main" xmlns:r="http://schemas.openxmlformats.org/officeDocument/2006/relationships" xmlns:p="http://schemas.openxmlformats.org/presentationml/2006/main">
+  <p:cSld>
+    <p:spTree>
+      <p:nvGrpSpPr>
+        <p:cNvPr id="1" name=""/>
+        <p:cNvGrpSpPr/>
+        <p:nvPr/>
+      </p:nvGrpSpPr>
+      <p:grpSpPr/>
+      <p:sp>
+        <p:nvSpPr>
+          <p:cNvPr id="2" name="标题 1"/>
+          <p:cNvSpPr>
+            <a:spLocks noGrp="1"/>
+          </p:cNvSpPr>
+          <p:nvPr>
+            <p:ph type="title"/>
+          </p:nvPr>
+        </p:nvSpPr>
+        <p:spPr/>
+        <p:txBody>
+          <a:bodyPr>
+            <a:normAutofit/>
+          </a:bodyPr>
+          <a:p>
+            <a:r>
+              <a:rPr lang="en-US" altLang="zh-CN">
+                <a:solidFill>
+                  <a:srgbClr val="FF0000"/>
+                </a:solidFill>
+              </a:rPr>
+              <a:t>Lie Groups</a:t>
+            </a:r>
+            <a:endParaRPr lang="en-US" altLang="zh-CN">
+              <a:solidFill>
+                <a:srgbClr val="FF0000"/>
+              </a:solidFill>
+            </a:endParaRPr>
+          </a:p>
+        </p:txBody>
+      </p:sp>
+      <p:cxnSp>
+        <p:nvCxnSpPr>
+          <p:cNvPr id="4" name="直接连接符 3"/>
+          <p:cNvCxnSpPr/>
+          <p:nvPr/>
+        </p:nvCxnSpPr>
+        <p:spPr>
+          <a:xfrm>
+            <a:off x="819785" y="1450340"/>
+            <a:ext cx="10552430" cy="20955"/>
+          </a:xfrm>
+          <a:prstGeom prst="line">
+            <a:avLst/>
+          </a:prstGeom>
+          <a:ln w="47625" cmpd="sng">
+            <a:solidFill>
+              <a:schemeClr val="accent1"/>
+            </a:solidFill>
+            <a:prstDash val="solid"/>
+          </a:ln>
+        </p:spPr>
+        <p:style>
+          <a:lnRef idx="1">
+            <a:schemeClr val="accent1"/>
+          </a:lnRef>
+          <a:fillRef idx="0">
+            <a:schemeClr val="accent1"/>
+          </a:fillRef>
+          <a:effectRef idx="0">
+            <a:schemeClr val="accent1"/>
+          </a:effectRef>
+          <a:fontRef idx="minor">
+            <a:schemeClr val="tx1"/>
+          </a:fontRef>
+        </p:style>
+      </p:cxnSp>
+      <p:pic>
+        <p:nvPicPr>
+          <p:cNvPr id="5" name="内容占位符 4"/>
+          <p:cNvPicPr>
+            <a:picLocks noChangeAspect="1"/>
+          </p:cNvPicPr>
+          <p:nvPr>
+            <p:ph idx="1"/>
+          </p:nvPr>
+        </p:nvPicPr>
+        <p:blipFill>
+          <a:blip r:embed="rId1"/>
+          <a:stretch>
+            <a:fillRect/>
+          </a:stretch>
+        </p:blipFill>
+        <p:spPr>
+          <a:xfrm>
+            <a:off x="1954530" y="1482725"/>
+            <a:ext cx="8520430" cy="5323840"/>
+          </a:xfrm>
+          <a:prstGeom prst="rect">
+            <a:avLst/>
+          </a:prstGeom>
+        </p:spPr>
+      </p:pic>
+    </p:spTree>
+  </p:cSld>
+  <p:clrMapOvr>
+    <a:masterClrMapping/>
+  </p:clrMapOvr>
+</p:sld>
+</file>
+
+<file path=ppt/slides/slide19.xml><?xml version="1.0" encoding="utf-8"?>
+<p:sld xmlns:a="http://schemas.openxmlformats.org/drawingml/2006/main" xmlns:r="http://schemas.openxmlformats.org/officeDocument/2006/relationships" xmlns:p="http://schemas.openxmlformats.org/presentationml/2006/main">
+  <p:cSld>
+    <p:spTree>
+      <p:nvGrpSpPr>
+        <p:cNvPr id="1" name=""/>
+        <p:cNvGrpSpPr/>
+        <p:nvPr/>
+      </p:nvGrpSpPr>
+      <p:grpSpPr/>
+      <p:sp>
+        <p:nvSpPr>
+          <p:cNvPr id="2" name="标题 1"/>
+          <p:cNvSpPr>
+            <a:spLocks noGrp="1"/>
+          </p:cNvSpPr>
+          <p:nvPr>
+            <p:ph type="title"/>
+          </p:nvPr>
+        </p:nvSpPr>
+        <p:spPr/>
+        <p:txBody>
+          <a:bodyPr>
+            <a:normAutofit/>
+          </a:bodyPr>
+          <a:p>
+            <a:r>
+              <a:rPr lang="en-US" altLang="zh-CN">
+                <a:solidFill>
+                  <a:srgbClr val="FF0000"/>
+                </a:solidFill>
+              </a:rPr>
+              <a:t>Lie Groups</a:t>
+            </a:r>
+            <a:endParaRPr lang="en-US" altLang="zh-CN">
+              <a:solidFill>
+                <a:srgbClr val="FF0000"/>
+              </a:solidFill>
+            </a:endParaRPr>
+          </a:p>
+        </p:txBody>
+      </p:sp>
+      <p:cxnSp>
+        <p:nvCxnSpPr>
+          <p:cNvPr id="4" name="直接连接符 3"/>
+          <p:cNvCxnSpPr/>
+          <p:nvPr/>
+        </p:nvCxnSpPr>
+        <p:spPr>
+          <a:xfrm>
+            <a:off x="819785" y="1450340"/>
+            <a:ext cx="10552430" cy="20955"/>
+          </a:xfrm>
+          <a:prstGeom prst="line">
+            <a:avLst/>
+          </a:prstGeom>
+          <a:ln w="47625" cmpd="sng">
+            <a:solidFill>
+              <a:schemeClr val="accent1"/>
+            </a:solidFill>
+            <a:prstDash val="solid"/>
+          </a:ln>
+        </p:spPr>
+        <p:style>
+          <a:lnRef idx="1">
+            <a:schemeClr val="accent1"/>
+          </a:lnRef>
+          <a:fillRef idx="0">
+            <a:schemeClr val="accent1"/>
+          </a:fillRef>
+          <a:effectRef idx="0">
+            <a:schemeClr val="accent1"/>
+          </a:effectRef>
+          <a:fontRef idx="minor">
+            <a:schemeClr val="tx1"/>
+          </a:fontRef>
+        </p:style>
+      </p:cxnSp>
+      <p:sp>
+        <p:nvSpPr>
+          <p:cNvPr id="3" name="内容占位符 2"/>
+          <p:cNvSpPr/>
+          <p:nvPr>
+            <p:ph idx="1"/>
+          </p:nvPr>
+        </p:nvSpPr>
+        <p:spPr/>
+        <p:txBody>
+          <a:bodyPr/>
+          <a:p>
+            <a:pPr marL="0" indent="0">
+              <a:buNone/>
+            </a:pPr>
+            <a:r>
+              <a:rPr lang="en-US" altLang="zh-CN"/>
+              <a:t>BCH</a:t>
+            </a:r>
+            <a:r>
+              <a:rPr lang="zh-CN" altLang="en-US"/>
+              <a:t>公式：</a:t>
+            </a:r>
+            <a:endParaRPr lang="zh-CN" altLang="en-US"/>
+          </a:p>
+        </p:txBody>
+      </p:sp>
+      <p:pic>
+        <p:nvPicPr>
+          <p:cNvPr id="6" name="图片 5"/>
+          <p:cNvPicPr>
+            <a:picLocks noChangeAspect="1"/>
+          </p:cNvPicPr>
+          <p:nvPr/>
+        </p:nvPicPr>
+        <p:blipFill>
+          <a:blip r:embed="rId1"/>
+          <a:stretch>
+            <a:fillRect/>
+          </a:stretch>
+        </p:blipFill>
+        <p:spPr>
+          <a:xfrm>
+            <a:off x="1609090" y="2350770"/>
+            <a:ext cx="9201150" cy="933450"/>
+          </a:xfrm>
+          <a:prstGeom prst="rect">
+            <a:avLst/>
+          </a:prstGeom>
+        </p:spPr>
+      </p:pic>
+      <p:pic>
+        <p:nvPicPr>
+          <p:cNvPr id="7" name="图片 6"/>
+          <p:cNvPicPr>
+            <a:picLocks noChangeAspect="1"/>
+          </p:cNvPicPr>
+          <p:nvPr/>
+        </p:nvPicPr>
+        <p:blipFill>
+          <a:blip r:embed="rId2"/>
+          <a:stretch>
+            <a:fillRect/>
+          </a:stretch>
+        </p:blipFill>
+        <p:spPr>
+          <a:xfrm>
+            <a:off x="2465705" y="3752215"/>
+            <a:ext cx="6991350" cy="1343025"/>
+          </a:xfrm>
+          <a:prstGeom prst="rect">
+            <a:avLst/>
+          </a:prstGeom>
+        </p:spPr>
+      </p:pic>
     </p:spTree>
   </p:cSld>
   <p:clrMapOvr>
@@ -4306,6 +5155,598 @@
           <a:xfrm>
             <a:off x="1725295" y="2152650"/>
             <a:ext cx="8181975" cy="4391025"/>
+          </a:xfrm>
+          <a:prstGeom prst="rect">
+            <a:avLst/>
+          </a:prstGeom>
+        </p:spPr>
+      </p:pic>
+    </p:spTree>
+  </p:cSld>
+  <p:clrMapOvr>
+    <a:masterClrMapping/>
+  </p:clrMapOvr>
+</p:sld>
+</file>
+
+<file path=ppt/slides/slide20.xml><?xml version="1.0" encoding="utf-8"?>
+<p:sld xmlns:a="http://schemas.openxmlformats.org/drawingml/2006/main" xmlns:r="http://schemas.openxmlformats.org/officeDocument/2006/relationships" xmlns:p="http://schemas.openxmlformats.org/presentationml/2006/main">
+  <p:cSld>
+    <p:spTree>
+      <p:nvGrpSpPr>
+        <p:cNvPr id="1" name=""/>
+        <p:cNvGrpSpPr/>
+        <p:nvPr/>
+      </p:nvGrpSpPr>
+      <p:grpSpPr/>
+      <p:sp>
+        <p:nvSpPr>
+          <p:cNvPr id="2" name="标题 1"/>
+          <p:cNvSpPr>
+            <a:spLocks noGrp="1"/>
+          </p:cNvSpPr>
+          <p:nvPr>
+            <p:ph type="title"/>
+          </p:nvPr>
+        </p:nvSpPr>
+        <p:spPr/>
+        <p:txBody>
+          <a:bodyPr>
+            <a:normAutofit/>
+          </a:bodyPr>
+          <a:p>
+            <a:r>
+              <a:rPr lang="en-US" altLang="zh-CN">
+                <a:solidFill>
+                  <a:srgbClr val="FF0000"/>
+                </a:solidFill>
+              </a:rPr>
+              <a:t>Lie Groups</a:t>
+            </a:r>
+            <a:endParaRPr lang="en-US" altLang="zh-CN">
+              <a:solidFill>
+                <a:srgbClr val="FF0000"/>
+              </a:solidFill>
+            </a:endParaRPr>
+          </a:p>
+        </p:txBody>
+      </p:sp>
+      <p:cxnSp>
+        <p:nvCxnSpPr>
+          <p:cNvPr id="4" name="直接连接符 3"/>
+          <p:cNvCxnSpPr/>
+          <p:nvPr/>
+        </p:nvCxnSpPr>
+        <p:spPr>
+          <a:xfrm>
+            <a:off x="819785" y="1450340"/>
+            <a:ext cx="10552430" cy="20955"/>
+          </a:xfrm>
+          <a:prstGeom prst="line">
+            <a:avLst/>
+          </a:prstGeom>
+          <a:ln w="47625" cmpd="sng">
+            <a:solidFill>
+              <a:schemeClr val="accent1"/>
+            </a:solidFill>
+            <a:prstDash val="solid"/>
+          </a:ln>
+        </p:spPr>
+        <p:style>
+          <a:lnRef idx="1">
+            <a:schemeClr val="accent1"/>
+          </a:lnRef>
+          <a:fillRef idx="0">
+            <a:schemeClr val="accent1"/>
+          </a:fillRef>
+          <a:effectRef idx="0">
+            <a:schemeClr val="accent1"/>
+          </a:effectRef>
+          <a:fontRef idx="minor">
+            <a:schemeClr val="tx1"/>
+          </a:fontRef>
+        </p:style>
+      </p:cxnSp>
+      <p:pic>
+        <p:nvPicPr>
+          <p:cNvPr id="8" name="内容占位符 7"/>
+          <p:cNvPicPr>
+            <a:picLocks noChangeAspect="1"/>
+          </p:cNvPicPr>
+          <p:nvPr>
+            <p:ph idx="1"/>
+          </p:nvPr>
+        </p:nvPicPr>
+        <p:blipFill>
+          <a:blip r:embed="rId1"/>
+          <a:stretch>
+            <a:fillRect/>
+          </a:stretch>
+        </p:blipFill>
+        <p:spPr>
+          <a:xfrm>
+            <a:off x="7964170" y="2015490"/>
+            <a:ext cx="1752600" cy="781050"/>
+          </a:xfrm>
+          <a:prstGeom prst="rect">
+            <a:avLst/>
+          </a:prstGeom>
+        </p:spPr>
+      </p:pic>
+      <p:pic>
+        <p:nvPicPr>
+          <p:cNvPr id="9" name="图片 8"/>
+          <p:cNvPicPr>
+            <a:picLocks noChangeAspect="1"/>
+          </p:cNvPicPr>
+          <p:nvPr/>
+        </p:nvPicPr>
+        <p:blipFill>
+          <a:blip r:embed="rId2"/>
+          <a:stretch>
+            <a:fillRect/>
+          </a:stretch>
+        </p:blipFill>
+        <p:spPr>
+          <a:xfrm>
+            <a:off x="8049895" y="2796540"/>
+            <a:ext cx="1666875" cy="571500"/>
+          </a:xfrm>
+          <a:prstGeom prst="rect">
+            <a:avLst/>
+          </a:prstGeom>
+        </p:spPr>
+      </p:pic>
+      <p:pic>
+        <p:nvPicPr>
+          <p:cNvPr id="10" name="图片 9"/>
+          <p:cNvPicPr>
+            <a:picLocks noChangeAspect="1"/>
+          </p:cNvPicPr>
+          <p:nvPr/>
+        </p:nvPicPr>
+        <p:blipFill>
+          <a:blip r:embed="rId3"/>
+          <a:stretch>
+            <a:fillRect/>
+          </a:stretch>
+        </p:blipFill>
+        <p:spPr>
+          <a:xfrm>
+            <a:off x="7192645" y="3944620"/>
+            <a:ext cx="3381375" cy="1019175"/>
+          </a:xfrm>
+          <a:prstGeom prst="rect">
+            <a:avLst/>
+          </a:prstGeom>
+        </p:spPr>
+      </p:pic>
+      <p:pic>
+        <p:nvPicPr>
+          <p:cNvPr id="11" name="图片 10"/>
+          <p:cNvPicPr>
+            <a:picLocks noChangeAspect="1"/>
+          </p:cNvPicPr>
+          <p:nvPr/>
+        </p:nvPicPr>
+        <p:blipFill>
+          <a:blip r:embed="rId4"/>
+          <a:stretch>
+            <a:fillRect/>
+          </a:stretch>
+        </p:blipFill>
+        <p:spPr>
+          <a:xfrm>
+            <a:off x="1024890" y="1804670"/>
+            <a:ext cx="5721350" cy="3609340"/>
+          </a:xfrm>
+          <a:prstGeom prst="rect">
+            <a:avLst/>
+          </a:prstGeom>
+        </p:spPr>
+      </p:pic>
+      <p:sp>
+        <p:nvSpPr>
+          <p:cNvPr id="12" name="下箭头 11"/>
+          <p:cNvSpPr/>
+          <p:nvPr/>
+        </p:nvSpPr>
+        <p:spPr>
+          <a:xfrm>
+            <a:off x="8597265" y="3368040"/>
+            <a:ext cx="331470" cy="715010"/>
+          </a:xfrm>
+          <a:prstGeom prst="downArrow">
+            <a:avLst/>
+          </a:prstGeom>
+          <a:noFill/>
+          <a:ln w="41275" cmpd="sng">
+            <a:solidFill>
+              <a:schemeClr val="accent6">
+                <a:lumMod val="75000"/>
+              </a:schemeClr>
+            </a:solidFill>
+            <a:prstDash val="solid"/>
+          </a:ln>
+        </p:spPr>
+        <p:style>
+          <a:lnRef idx="2">
+            <a:schemeClr val="accent1">
+              <a:shade val="50000"/>
+            </a:schemeClr>
+          </a:lnRef>
+          <a:fillRef idx="1">
+            <a:schemeClr val="accent1"/>
+          </a:fillRef>
+          <a:effectRef idx="0">
+            <a:schemeClr val="accent1"/>
+          </a:effectRef>
+          <a:fontRef idx="minor">
+            <a:schemeClr val="lt1"/>
+          </a:fontRef>
+        </p:style>
+        <p:txBody>
+          <a:bodyPr rtlCol="0" anchor="ctr"/>
+          <a:p>
+            <a:pPr algn="ctr"/>
+            <a:endParaRPr lang="zh-CN" altLang="en-US"/>
+          </a:p>
+        </p:txBody>
+      </p:sp>
+    </p:spTree>
+  </p:cSld>
+  <p:clrMapOvr>
+    <a:masterClrMapping/>
+  </p:clrMapOvr>
+</p:sld>
+</file>
+
+<file path=ppt/slides/slide21.xml><?xml version="1.0" encoding="utf-8"?>
+<p:sld xmlns:a="http://schemas.openxmlformats.org/drawingml/2006/main" xmlns:r="http://schemas.openxmlformats.org/officeDocument/2006/relationships" xmlns:p="http://schemas.openxmlformats.org/presentationml/2006/main">
+  <p:cSld>
+    <p:spTree>
+      <p:nvGrpSpPr>
+        <p:cNvPr id="1" name=""/>
+        <p:cNvGrpSpPr/>
+        <p:nvPr/>
+      </p:nvGrpSpPr>
+      <p:grpSpPr/>
+      <p:sp>
+        <p:nvSpPr>
+          <p:cNvPr id="2" name="标题 1"/>
+          <p:cNvSpPr>
+            <a:spLocks noGrp="1"/>
+          </p:cNvSpPr>
+          <p:nvPr>
+            <p:ph type="title"/>
+          </p:nvPr>
+        </p:nvSpPr>
+        <p:spPr/>
+        <p:txBody>
+          <a:bodyPr>
+            <a:normAutofit/>
+          </a:bodyPr>
+          <a:p>
+            <a:r>
+              <a:rPr lang="en-US" altLang="zh-CN">
+                <a:solidFill>
+                  <a:srgbClr val="FF0000"/>
+                </a:solidFill>
+              </a:rPr>
+              <a:t>Lie Groups</a:t>
+            </a:r>
+            <a:endParaRPr lang="en-US" altLang="zh-CN">
+              <a:solidFill>
+                <a:srgbClr val="FF0000"/>
+              </a:solidFill>
+            </a:endParaRPr>
+          </a:p>
+        </p:txBody>
+      </p:sp>
+      <p:cxnSp>
+        <p:nvCxnSpPr>
+          <p:cNvPr id="4" name="直接连接符 3"/>
+          <p:cNvCxnSpPr/>
+          <p:nvPr/>
+        </p:nvCxnSpPr>
+        <p:spPr>
+          <a:xfrm>
+            <a:off x="819785" y="1450340"/>
+            <a:ext cx="10552430" cy="20955"/>
+          </a:xfrm>
+          <a:prstGeom prst="line">
+            <a:avLst/>
+          </a:prstGeom>
+          <a:ln w="47625" cmpd="sng">
+            <a:solidFill>
+              <a:schemeClr val="accent1"/>
+            </a:solidFill>
+            <a:prstDash val="solid"/>
+          </a:ln>
+        </p:spPr>
+        <p:style>
+          <a:lnRef idx="1">
+            <a:schemeClr val="accent1"/>
+          </a:lnRef>
+          <a:fillRef idx="0">
+            <a:schemeClr val="accent1"/>
+          </a:fillRef>
+          <a:effectRef idx="0">
+            <a:schemeClr val="accent1"/>
+          </a:effectRef>
+          <a:fontRef idx="minor">
+            <a:schemeClr val="tx1"/>
+          </a:fontRef>
+        </p:style>
+      </p:cxnSp>
+      <p:pic>
+        <p:nvPicPr>
+          <p:cNvPr id="8" name="内容占位符 7"/>
+          <p:cNvPicPr>
+            <a:picLocks noChangeAspect="1"/>
+          </p:cNvPicPr>
+          <p:nvPr>
+            <p:ph idx="1"/>
+          </p:nvPr>
+        </p:nvPicPr>
+        <p:blipFill>
+          <a:blip r:embed="rId1"/>
+          <a:stretch>
+            <a:fillRect/>
+          </a:stretch>
+        </p:blipFill>
+        <p:spPr>
+          <a:xfrm>
+            <a:off x="1395730" y="1790065"/>
+            <a:ext cx="9399905" cy="4485005"/>
+          </a:xfrm>
+          <a:prstGeom prst="rect">
+            <a:avLst/>
+          </a:prstGeom>
+        </p:spPr>
+      </p:pic>
+    </p:spTree>
+  </p:cSld>
+  <p:clrMapOvr>
+    <a:masterClrMapping/>
+  </p:clrMapOvr>
+</p:sld>
+</file>
+
+<file path=ppt/slides/slide22.xml><?xml version="1.0" encoding="utf-8"?>
+<p:sld xmlns:a="http://schemas.openxmlformats.org/drawingml/2006/main" xmlns:r="http://schemas.openxmlformats.org/officeDocument/2006/relationships" xmlns:p="http://schemas.openxmlformats.org/presentationml/2006/main">
+  <p:cSld>
+    <p:spTree>
+      <p:nvGrpSpPr>
+        <p:cNvPr id="1" name=""/>
+        <p:cNvGrpSpPr/>
+        <p:nvPr/>
+      </p:nvGrpSpPr>
+      <p:grpSpPr/>
+      <p:sp>
+        <p:nvSpPr>
+          <p:cNvPr id="2" name="标题 1"/>
+          <p:cNvSpPr>
+            <a:spLocks noGrp="1"/>
+          </p:cNvSpPr>
+          <p:nvPr>
+            <p:ph type="title"/>
+          </p:nvPr>
+        </p:nvSpPr>
+        <p:spPr/>
+        <p:txBody>
+          <a:bodyPr>
+            <a:normAutofit/>
+          </a:bodyPr>
+          <a:p>
+            <a:r>
+              <a:rPr lang="en-US" altLang="zh-CN">
+                <a:solidFill>
+                  <a:srgbClr val="FF0000"/>
+                </a:solidFill>
+              </a:rPr>
+              <a:t>Lie Groups</a:t>
+            </a:r>
+            <a:endParaRPr lang="en-US" altLang="zh-CN">
+              <a:solidFill>
+                <a:srgbClr val="FF0000"/>
+              </a:solidFill>
+            </a:endParaRPr>
+          </a:p>
+        </p:txBody>
+      </p:sp>
+      <p:cxnSp>
+        <p:nvCxnSpPr>
+          <p:cNvPr id="4" name="直接连接符 3"/>
+          <p:cNvCxnSpPr/>
+          <p:nvPr/>
+        </p:nvCxnSpPr>
+        <p:spPr>
+          <a:xfrm>
+            <a:off x="819785" y="1450340"/>
+            <a:ext cx="10552430" cy="20955"/>
+          </a:xfrm>
+          <a:prstGeom prst="line">
+            <a:avLst/>
+          </a:prstGeom>
+          <a:ln w="47625" cmpd="sng">
+            <a:solidFill>
+              <a:schemeClr val="accent1"/>
+            </a:solidFill>
+            <a:prstDash val="solid"/>
+          </a:ln>
+        </p:spPr>
+        <p:style>
+          <a:lnRef idx="1">
+            <a:schemeClr val="accent1"/>
+          </a:lnRef>
+          <a:fillRef idx="0">
+            <a:schemeClr val="accent1"/>
+          </a:fillRef>
+          <a:effectRef idx="0">
+            <a:schemeClr val="accent1"/>
+          </a:effectRef>
+          <a:fontRef idx="minor">
+            <a:schemeClr val="tx1"/>
+          </a:fontRef>
+        </p:style>
+      </p:cxnSp>
+      <p:pic>
+        <p:nvPicPr>
+          <p:cNvPr id="5" name="内容占位符 4"/>
+          <p:cNvPicPr>
+            <a:picLocks noChangeAspect="1"/>
+          </p:cNvPicPr>
+          <p:nvPr>
+            <p:ph idx="1"/>
+          </p:nvPr>
+        </p:nvPicPr>
+        <p:blipFill>
+          <a:blip r:embed="rId1"/>
+          <a:stretch>
+            <a:fillRect/>
+          </a:stretch>
+        </p:blipFill>
+        <p:spPr>
+          <a:xfrm>
+            <a:off x="1735455" y="2026920"/>
+            <a:ext cx="8720455" cy="3265170"/>
+          </a:xfrm>
+          <a:prstGeom prst="rect">
+            <a:avLst/>
+          </a:prstGeom>
+        </p:spPr>
+      </p:pic>
+    </p:spTree>
+  </p:cSld>
+  <p:clrMapOvr>
+    <a:masterClrMapping/>
+  </p:clrMapOvr>
+</p:sld>
+</file>
+
+<file path=ppt/slides/slide23.xml><?xml version="1.0" encoding="utf-8"?>
+<p:sld xmlns:a="http://schemas.openxmlformats.org/drawingml/2006/main" xmlns:r="http://schemas.openxmlformats.org/officeDocument/2006/relationships" xmlns:p="http://schemas.openxmlformats.org/presentationml/2006/main">
+  <p:cSld>
+    <p:spTree>
+      <p:nvGrpSpPr>
+        <p:cNvPr id="1" name=""/>
+        <p:cNvGrpSpPr/>
+        <p:nvPr/>
+      </p:nvGrpSpPr>
+      <p:grpSpPr/>
+      <p:sp>
+        <p:nvSpPr>
+          <p:cNvPr id="2" name="标题 1"/>
+          <p:cNvSpPr>
+            <a:spLocks noGrp="1"/>
+          </p:cNvSpPr>
+          <p:nvPr>
+            <p:ph type="title"/>
+          </p:nvPr>
+        </p:nvSpPr>
+        <p:spPr/>
+        <p:txBody>
+          <a:bodyPr>
+            <a:normAutofit/>
+          </a:bodyPr>
+          <a:p>
+            <a:r>
+              <a:rPr lang="en-US" altLang="zh-CN">
+                <a:solidFill>
+                  <a:srgbClr val="FF0000"/>
+                </a:solidFill>
+              </a:rPr>
+              <a:t>Lie Groups</a:t>
+            </a:r>
+            <a:endParaRPr lang="en-US" altLang="zh-CN">
+              <a:solidFill>
+                <a:srgbClr val="FF0000"/>
+              </a:solidFill>
+            </a:endParaRPr>
+          </a:p>
+        </p:txBody>
+      </p:sp>
+      <p:cxnSp>
+        <p:nvCxnSpPr>
+          <p:cNvPr id="4" name="直接连接符 3"/>
+          <p:cNvCxnSpPr/>
+          <p:nvPr/>
+        </p:nvCxnSpPr>
+        <p:spPr>
+          <a:xfrm>
+            <a:off x="819785" y="1450340"/>
+            <a:ext cx="10552430" cy="20955"/>
+          </a:xfrm>
+          <a:prstGeom prst="line">
+            <a:avLst/>
+          </a:prstGeom>
+          <a:ln w="47625" cmpd="sng">
+            <a:solidFill>
+              <a:schemeClr val="accent1"/>
+            </a:solidFill>
+            <a:prstDash val="solid"/>
+          </a:ln>
+        </p:spPr>
+        <p:style>
+          <a:lnRef idx="1">
+            <a:schemeClr val="accent1"/>
+          </a:lnRef>
+          <a:fillRef idx="0">
+            <a:schemeClr val="accent1"/>
+          </a:fillRef>
+          <a:effectRef idx="0">
+            <a:schemeClr val="accent1"/>
+          </a:effectRef>
+          <a:fontRef idx="minor">
+            <a:schemeClr val="tx1"/>
+          </a:fontRef>
+        </p:style>
+      </p:cxnSp>
+      <p:pic>
+        <p:nvPicPr>
+          <p:cNvPr id="6" name="内容占位符 5"/>
+          <p:cNvPicPr>
+            <a:picLocks noChangeAspect="1"/>
+          </p:cNvPicPr>
+          <p:nvPr>
+            <p:ph idx="1"/>
+          </p:nvPr>
+        </p:nvPicPr>
+        <p:blipFill>
+          <a:blip r:embed="rId1"/>
+          <a:stretch>
+            <a:fillRect/>
+          </a:stretch>
+        </p:blipFill>
+        <p:spPr>
+          <a:xfrm>
+            <a:off x="2371725" y="2489835"/>
+            <a:ext cx="7448550" cy="4181475"/>
+          </a:xfrm>
+          <a:prstGeom prst="rect">
+            <a:avLst/>
+          </a:prstGeom>
+        </p:spPr>
+      </p:pic>
+      <p:pic>
+        <p:nvPicPr>
+          <p:cNvPr id="7" name="图片 6"/>
+          <p:cNvPicPr>
+            <a:picLocks noChangeAspect="1"/>
+          </p:cNvPicPr>
+          <p:nvPr/>
+        </p:nvPicPr>
+        <p:blipFill>
+          <a:blip r:embed="rId2"/>
+          <a:stretch>
+            <a:fillRect/>
+          </a:stretch>
+        </p:blipFill>
+        <p:spPr>
+          <a:xfrm>
+            <a:off x="1945640" y="1691005"/>
+            <a:ext cx="5629275" cy="876300"/>
           </a:xfrm>
           <a:prstGeom prst="rect">
             <a:avLst/>

</xml_diff>